<commit_message>
orm 02 session added
</commit_message>
<xml_diff>
--- a/orm/orm-02.pptx
+++ b/orm/orm-02.pptx
@@ -205,7 +205,7 @@
           <a:p>
             <a:fld id="{9B9ECB28-6A22-4037-9487-F3F739F744D6}" type="datetimeFigureOut">
               <a:rPr lang="en-US" smtClean="0"/>
-              <a:t>12/24/2021</a:t>
+              <a:t>12/26/2021</a:t>
             </a:fld>
             <a:endParaRPr lang="en-US"/>
           </a:p>
@@ -656,7 +656,7 @@
           <a:p>
             <a:fld id="{04292BB3-D7FE-4490-A369-7BA9FA0F2D7D}" type="datetime1">
               <a:rPr lang="en-US" smtClean="0"/>
-              <a:t>12/24/2021</a:t>
+              <a:t>12/26/2021</a:t>
             </a:fld>
             <a:endParaRPr lang="en-US" dirty="0"/>
           </a:p>
@@ -965,7 +965,7 @@
           <a:p>
             <a:fld id="{71430156-F29C-46EC-A871-806AE8294476}" type="datetime1">
               <a:rPr lang="en-US" smtClean="0"/>
-              <a:t>12/24/2021</a:t>
+              <a:t>12/26/2021</a:t>
             </a:fld>
             <a:endParaRPr lang="en-US" dirty="0"/>
           </a:p>
@@ -1163,7 +1163,7 @@
           <a:p>
             <a:fld id="{452C1D77-010B-4F6F-9888-C3320C9E1C83}" type="datetime1">
               <a:rPr lang="en-US" smtClean="0"/>
-              <a:t>12/24/2021</a:t>
+              <a:t>12/26/2021</a:t>
             </a:fld>
             <a:endParaRPr lang="en-US" dirty="0"/>
           </a:p>
@@ -1430,7 +1430,7 @@
           <a:p>
             <a:fld id="{5FE0F86D-F97D-48BB-BD0F-99F6CE010ADF}" type="datetime1">
               <a:rPr lang="en-US" smtClean="0"/>
-              <a:t>12/24/2021</a:t>
+              <a:t>12/26/2021</a:t>
             </a:fld>
             <a:endParaRPr lang="en-US" dirty="0"/>
           </a:p>
@@ -1870,7 +1870,7 @@
           <a:p>
             <a:fld id="{223B543A-94C7-4785-BA8F-D2DF664B813B}" type="datetime1">
               <a:rPr lang="en-US" smtClean="0"/>
-              <a:t>12/24/2021</a:t>
+              <a:t>12/26/2021</a:t>
             </a:fld>
             <a:endParaRPr lang="en-US" dirty="0"/>
           </a:p>
@@ -2411,7 +2411,7 @@
           <a:p>
             <a:fld id="{C6188102-512C-443F-80D2-B8F38A68E8E0}" type="datetime1">
               <a:rPr lang="en-US" smtClean="0"/>
-              <a:t>12/24/2021</a:t>
+              <a:t>12/26/2021</a:t>
             </a:fld>
             <a:endParaRPr lang="en-US" dirty="0"/>
           </a:p>
@@ -3297,7 +3297,7 @@
           <a:p>
             <a:fld id="{D6E94816-01EF-4877-B644-9B335C39E9B1}" type="datetime1">
               <a:rPr lang="en-US" smtClean="0"/>
-              <a:t>12/24/2021</a:t>
+              <a:t>12/26/2021</a:t>
             </a:fld>
             <a:endParaRPr lang="en-US" dirty="0"/>
           </a:p>
@@ -3471,7 +3471,7 @@
           <a:p>
             <a:fld id="{2F4AFB9C-1CA0-4C59-AF85-2C64F7A24A2B}" type="datetime1">
               <a:rPr lang="en-US" smtClean="0"/>
-              <a:t>12/24/2021</a:t>
+              <a:t>12/26/2021</a:t>
             </a:fld>
             <a:endParaRPr lang="en-US" dirty="0"/>
           </a:p>
@@ -3659,7 +3659,7 @@
           <a:p>
             <a:fld id="{C2849F83-4F55-4CEC-BF3D-4AB5FE85918E}" type="datetime1">
               <a:rPr lang="en-US" smtClean="0"/>
-              <a:t>12/24/2021</a:t>
+              <a:t>12/26/2021</a:t>
             </a:fld>
             <a:endParaRPr lang="en-US" dirty="0"/>
           </a:p>
@@ -3833,7 +3833,7 @@
           <a:p>
             <a:fld id="{7CE8E275-0A33-4735-B717-275101F6E22C}" type="datetime1">
               <a:rPr lang="en-US" smtClean="0"/>
-              <a:t>12/24/2021</a:t>
+              <a:t>12/26/2021</a:t>
             </a:fld>
             <a:endParaRPr lang="en-US" dirty="0"/>
           </a:p>
@@ -4081,7 +4081,7 @@
           <a:p>
             <a:fld id="{11DE1D34-5930-414B-861A-C08DBE059BCD}" type="datetime1">
               <a:rPr lang="en-US" smtClean="0"/>
-              <a:t>12/24/2021</a:t>
+              <a:t>12/26/2021</a:t>
             </a:fld>
             <a:endParaRPr lang="en-US" dirty="0"/>
           </a:p>
@@ -4327,7 +4327,7 @@
           <a:p>
             <a:fld id="{1F0B5F0E-C69B-493D-BC11-8AC8D8992B44}" type="datetime1">
               <a:rPr lang="en-US" smtClean="0"/>
-              <a:t>12/24/2021</a:t>
+              <a:t>12/26/2021</a:t>
             </a:fld>
             <a:endParaRPr lang="en-US" dirty="0"/>
           </a:p>
@@ -4814,7 +4814,7 @@
           <a:p>
             <a:fld id="{B5172908-172A-4EC8-B0B5-05FD12C13D2A}" type="datetime1">
               <a:rPr lang="en-US" smtClean="0"/>
-              <a:t>12/24/2021</a:t>
+              <a:t>12/26/2021</a:t>
             </a:fld>
             <a:endParaRPr lang="en-US" dirty="0"/>
           </a:p>
@@ -4936,7 +4936,7 @@
           <a:p>
             <a:fld id="{1C7364DF-3607-4A5A-AB83-404A3BB8D335}" type="datetime1">
               <a:rPr lang="en-US" smtClean="0"/>
-              <a:t>12/24/2021</a:t>
+              <a:t>12/26/2021</a:t>
             </a:fld>
             <a:endParaRPr lang="en-US" dirty="0"/>
           </a:p>
@@ -5035,7 +5035,7 @@
           <a:p>
             <a:fld id="{AC157155-FDF4-4485-AFEF-D9170575ED26}" type="datetime1">
               <a:rPr lang="en-US" smtClean="0"/>
-              <a:t>12/24/2021</a:t>
+              <a:t>12/26/2021</a:t>
             </a:fld>
             <a:endParaRPr lang="en-US" dirty="0"/>
           </a:p>
@@ -5294,7 +5294,7 @@
           <a:p>
             <a:fld id="{4E0CDAD6-4FF7-4455-A473-3E54CC5E4B8D}" type="datetime1">
               <a:rPr lang="en-US" smtClean="0"/>
-              <a:t>12/24/2021</a:t>
+              <a:t>12/26/2021</a:t>
             </a:fld>
             <a:endParaRPr lang="en-US" dirty="0"/>
           </a:p>
@@ -5605,7 +5605,7 @@
           <a:p>
             <a:fld id="{14F360E8-6D9C-4BF1-AB66-4049DE6B2F72}" type="datetime1">
               <a:rPr lang="en-US" smtClean="0"/>
-              <a:t>12/24/2021</a:t>
+              <a:t>12/26/2021</a:t>
             </a:fld>
             <a:endParaRPr lang="en-US" dirty="0"/>
           </a:p>
@@ -5842,7 +5842,7 @@
           <a:p>
             <a:fld id="{67EFE8E3-5D3D-4D11-AF9A-841EFA9359C2}" type="datetime1">
               <a:rPr lang="en-US" smtClean="0"/>
-              <a:t>12/24/2021</a:t>
+              <a:t>12/26/2021</a:t>
             </a:fld>
             <a:endParaRPr lang="en-US" dirty="0"/>
           </a:p>
@@ -7519,42 +7519,62 @@
           <a:p>
             <a:pPr lvl="1"/>
             <a:r>
-              <a:rPr lang="en-US" dirty="0" err="1"/>
+              <a:rPr lang="en-US" dirty="0" err="1">
+                <a:latin typeface="Consolas" panose="020B0609020204030204" pitchFamily="49" charset="0"/>
+              </a:rPr>
               <a:t>ManyToOne</a:t>
             </a:r>
-            <a:endParaRPr lang="en-US" dirty="0"/>
+            <a:endParaRPr lang="en-US" dirty="0">
+              <a:latin typeface="Consolas" panose="020B0609020204030204" pitchFamily="49" charset="0"/>
+            </a:endParaRPr>
           </a:p>
           <a:p>
             <a:pPr lvl="2"/>
             <a:r>
-              <a:rPr lang="en-US" dirty="0" err="1"/>
+              <a:rPr lang="en-US" dirty="0" err="1">
+                <a:latin typeface="Consolas" panose="020B0609020204030204" pitchFamily="49" charset="0"/>
+              </a:rPr>
               <a:t>JoinColumn</a:t>
             </a:r>
-            <a:endParaRPr lang="en-US" dirty="0"/>
+            <a:endParaRPr lang="en-US" dirty="0">
+              <a:latin typeface="Consolas" panose="020B0609020204030204" pitchFamily="49" charset="0"/>
+            </a:endParaRPr>
           </a:p>
           <a:p>
             <a:pPr lvl="1"/>
             <a:r>
-              <a:rPr lang="en-US" dirty="0" err="1"/>
+              <a:rPr lang="en-US" dirty="0" err="1">
+                <a:latin typeface="Consolas" panose="020B0609020204030204" pitchFamily="49" charset="0"/>
+              </a:rPr>
               <a:t>OneToMany</a:t>
             </a:r>
-            <a:endParaRPr lang="en-US" dirty="0"/>
+            <a:endParaRPr lang="en-US" dirty="0">
+              <a:latin typeface="Consolas" panose="020B0609020204030204" pitchFamily="49" charset="0"/>
+            </a:endParaRPr>
           </a:p>
           <a:p>
             <a:pPr lvl="1"/>
             <a:r>
-              <a:rPr lang="en-US" dirty="0" err="1"/>
+              <a:rPr lang="en-US" dirty="0" err="1">
+                <a:latin typeface="Consolas" panose="020B0609020204030204" pitchFamily="49" charset="0"/>
+              </a:rPr>
               <a:t>ManyToMany</a:t>
             </a:r>
-            <a:endParaRPr lang="en-US" dirty="0"/>
+            <a:endParaRPr lang="en-US" dirty="0">
+              <a:latin typeface="Consolas" panose="020B0609020204030204" pitchFamily="49" charset="0"/>
+            </a:endParaRPr>
           </a:p>
           <a:p>
             <a:pPr lvl="2"/>
             <a:r>
-              <a:rPr lang="en-US" dirty="0" err="1"/>
+              <a:rPr lang="en-US" dirty="0" err="1">
+                <a:latin typeface="Consolas" panose="020B0609020204030204" pitchFamily="49" charset="0"/>
+              </a:rPr>
               <a:t>JoinTable</a:t>
             </a:r>
-            <a:endParaRPr lang="en-US" dirty="0"/>
+            <a:endParaRPr lang="en-US" dirty="0">
+              <a:latin typeface="Consolas" panose="020B0609020204030204" pitchFamily="49" charset="0"/>
+            </a:endParaRPr>
           </a:p>
           <a:p>
             <a:pPr lvl="2"/>
@@ -7717,7 +7737,9 @@
           </a:p>
           <a:p>
             <a:r>
-              <a:rPr lang="en-US" dirty="0" err="1"/>
+              <a:rPr lang="en-US" sz="2100" dirty="0" err="1">
+                <a:latin typeface="Consolas" panose="020B0609020204030204" pitchFamily="49" charset="0"/>
+              </a:rPr>
               <a:t>BaseEntity</a:t>
             </a:r>
             <a:r>
@@ -7734,15 +7756,31 @@
           <a:p>
             <a:pPr lvl="1"/>
             <a:r>
+              <a:rPr lang="en-US" dirty="0">
+                <a:latin typeface="Consolas" panose="020B0609020204030204" pitchFamily="49" charset="0"/>
+              </a:rPr>
+              <a:t>create()</a:t>
+            </a:r>
+            <a:r>
               <a:rPr lang="en-US" dirty="0"/>
-              <a:t>create(): creates the object</a:t>
+              <a:t>: creates the object</a:t>
             </a:r>
           </a:p>
           <a:p>
             <a:pPr lvl="1"/>
             <a:r>
               <a:rPr lang="en-US" dirty="0"/>
-              <a:t>You have to call save() on that object to save it to the db.</a:t>
+              <a:t>You have to call </a:t>
+            </a:r>
+            <a:r>
+              <a:rPr lang="en-US" dirty="0">
+                <a:latin typeface="Consolas" panose="020B0609020204030204" pitchFamily="49" charset="0"/>
+              </a:rPr>
+              <a:t>save() </a:t>
+            </a:r>
+            <a:r>
+              <a:rPr lang="en-US" dirty="0"/>
+              <a:t>on that object to save it to the db.</a:t>
             </a:r>
           </a:p>
           <a:p>
@@ -7904,18 +7942,26 @@
           <a:p>
             <a:pPr lvl="1"/>
             <a:r>
-              <a:rPr lang="en-US" dirty="0" err="1"/>
+              <a:rPr lang="en-US" dirty="0" err="1">
+                <a:latin typeface="Consolas" panose="020B0609020204030204" pitchFamily="49" charset="0"/>
+              </a:rPr>
               <a:t>OneToMany</a:t>
             </a:r>
-            <a:endParaRPr lang="en-US" dirty="0"/>
+            <a:endParaRPr lang="en-US" dirty="0">
+              <a:latin typeface="Consolas" panose="020B0609020204030204" pitchFamily="49" charset="0"/>
+            </a:endParaRPr>
           </a:p>
           <a:p>
             <a:pPr lvl="1"/>
             <a:r>
-              <a:rPr lang="en-US" dirty="0" err="1"/>
+              <a:rPr lang="en-US" dirty="0" err="1">
+                <a:latin typeface="Consolas" panose="020B0609020204030204" pitchFamily="49" charset="0"/>
+              </a:rPr>
               <a:t>ManyToMany</a:t>
             </a:r>
-            <a:endParaRPr lang="en-US" dirty="0"/>
+            <a:endParaRPr lang="en-US" dirty="0">
+              <a:latin typeface="Consolas" panose="020B0609020204030204" pitchFamily="49" charset="0"/>
+            </a:endParaRPr>
           </a:p>
           <a:p>
             <a:pPr lvl="1"/>

</xml_diff>